<commit_message>
Update project plan per Mar 17 standup
</commit_message>
<xml_diff>
--- a/_project_management/reviews/review-202303110-project-prereview.pptx
+++ b/_project_management/reviews/review-202303110-project-prereview.pptx
@@ -115,13 +115,18 @@
       </a:defRPr>
     </a:lvl9pPr>
   </p:defaultTextStyle>
+  <p:extLst>
+    <p:ext uri="{EFAFB233-063F-42B5-8137-9DF3F51BA10A}">
+      <p15:sldGuideLst xmlns:p15="http://schemas.microsoft.com/office/powerpoint/2012/main"/>
+    </p:ext>
+  </p:extLst>
 </p:presentation>
 </file>
 
 <file path=ppt/revisionInfo.xml><?xml version="1.0" encoding="utf-8"?>
 <p1510:revInfo xmlns:a="http://schemas.openxmlformats.org/drawingml/2006/main" xmlns:r="http://schemas.openxmlformats.org/officeDocument/2006/relationships" xmlns:p1510="http://schemas.microsoft.com/office/powerpoint/2015/10/main">
   <p1510:revLst>
-    <p1510:client id="{8A5E4BD2-5EE0-4954-8334-BA8F1411C761}" v="76" dt="2023-03-16T18:50:33.732"/>
+    <p1510:client id="{8A5E4BD2-5EE0-4954-8334-BA8F1411C761}" v="77" dt="2023-03-17T14:15:30.446"/>
   </p1510:revLst>
 </p1510:revInfo>
 </file>
@@ -131,7 +136,7 @@
   <pc:docChgLst>
     <pc:chgData name="Matt Burns" userId="a4ff0c107545f849" providerId="LiveId" clId="{8A5E4BD2-5EE0-4954-8334-BA8F1411C761}"/>
     <pc:docChg chg="undo redo custSel addSld delSld modSld">
-      <pc:chgData name="Matt Burns" userId="a4ff0c107545f849" providerId="LiveId" clId="{8A5E4BD2-5EE0-4954-8334-BA8F1411C761}" dt="2023-03-16T18:52:56.346" v="940" actId="47"/>
+      <pc:chgData name="Matt Burns" userId="a4ff0c107545f849" providerId="LiveId" clId="{8A5E4BD2-5EE0-4954-8334-BA8F1411C761}" dt="2023-03-17T14:15:32.276" v="942" actId="478"/>
       <pc:docMkLst>
         <pc:docMk/>
       </pc:docMkLst>
@@ -427,7 +432,7 @@
         </pc:graphicFrameChg>
       </pc:sldChg>
       <pc:sldChg chg="addSp delSp modSp new mod">
-        <pc:chgData name="Matt Burns" userId="a4ff0c107545f849" providerId="LiveId" clId="{8A5E4BD2-5EE0-4954-8334-BA8F1411C761}" dt="2023-03-16T18:52:51.352" v="939" actId="14734"/>
+        <pc:chgData name="Matt Burns" userId="a4ff0c107545f849" providerId="LiveId" clId="{8A5E4BD2-5EE0-4954-8334-BA8F1411C761}" dt="2023-03-17T14:15:32.276" v="942" actId="478"/>
         <pc:sldMkLst>
           <pc:docMk/>
           <pc:sldMk cId="4224935650" sldId="261"/>
@@ -456,6 +461,14 @@
             <ac:spMk id="5" creationId="{DB7014AE-DD48-F7C1-8876-6BA089E77D33}"/>
           </ac:spMkLst>
         </pc:spChg>
+        <pc:graphicFrameChg chg="add del">
+          <ac:chgData name="Matt Burns" userId="a4ff0c107545f849" providerId="LiveId" clId="{8A5E4BD2-5EE0-4954-8334-BA8F1411C761}" dt="2023-03-17T14:15:32.276" v="942" actId="478"/>
+          <ac:graphicFrameMkLst>
+            <pc:docMk/>
+            <pc:sldMk cId="4224935650" sldId="261"/>
+            <ac:graphicFrameMk id="3" creationId="{5AA79C22-A822-4998-C1DE-BBDBDFD0776A}"/>
+          </ac:graphicFrameMkLst>
+        </pc:graphicFrameChg>
         <pc:graphicFrameChg chg="add del mod">
           <ac:chgData name="Matt Burns" userId="a4ff0c107545f849" providerId="LiveId" clId="{8A5E4BD2-5EE0-4954-8334-BA8F1411C761}" dt="2023-03-16T18:50:26.764" v="871"/>
           <ac:graphicFrameMkLst>
@@ -2993,7 +3006,7 @@
           <a:p>
             <a:fld id="{C8669077-1F13-4707-957A-C7373207963B}" type="datetimeFigureOut">
               <a:rPr lang="en-US" smtClean="0"/>
-              <a:t>3/16/2023</a:t>
+              <a:t>3/17/2023</a:t>
             </a:fld>
             <a:endParaRPr lang="en-US"/>
           </a:p>
@@ -3268,7 +3281,7 @@
           <a:p>
             <a:fld id="{C8669077-1F13-4707-957A-C7373207963B}" type="datetimeFigureOut">
               <a:rPr lang="en-US" smtClean="0"/>
-              <a:t>3/16/2023</a:t>
+              <a:t>3/17/2023</a:t>
             </a:fld>
             <a:endParaRPr lang="en-US"/>
           </a:p>
@@ -3462,7 +3475,7 @@
           <a:p>
             <a:fld id="{C8669077-1F13-4707-957A-C7373207963B}" type="datetimeFigureOut">
               <a:rPr lang="en-US" smtClean="0"/>
-              <a:t>3/16/2023</a:t>
+              <a:t>3/17/2023</a:t>
             </a:fld>
             <a:endParaRPr lang="en-US"/>
           </a:p>
@@ -3735,7 +3748,7 @@
           <a:p>
             <a:fld id="{C8669077-1F13-4707-957A-C7373207963B}" type="datetimeFigureOut">
               <a:rPr lang="en-US" smtClean="0"/>
-              <a:t>3/16/2023</a:t>
+              <a:t>3/17/2023</a:t>
             </a:fld>
             <a:endParaRPr lang="en-US"/>
           </a:p>
@@ -4076,7 +4089,7 @@
           <a:p>
             <a:fld id="{C8669077-1F13-4707-957A-C7373207963B}" type="datetimeFigureOut">
               <a:rPr lang="en-US" smtClean="0"/>
-              <a:t>3/16/2023</a:t>
+              <a:t>3/17/2023</a:t>
             </a:fld>
             <a:endParaRPr lang="en-US"/>
           </a:p>
@@ -4699,7 +4712,7 @@
           <a:p>
             <a:fld id="{C8669077-1F13-4707-957A-C7373207963B}" type="datetimeFigureOut">
               <a:rPr lang="en-US" smtClean="0"/>
-              <a:t>3/16/2023</a:t>
+              <a:t>3/17/2023</a:t>
             </a:fld>
             <a:endParaRPr lang="en-US"/>
           </a:p>
@@ -5559,7 +5572,7 @@
           <a:p>
             <a:fld id="{C8669077-1F13-4707-957A-C7373207963B}" type="datetimeFigureOut">
               <a:rPr lang="en-US" smtClean="0"/>
-              <a:t>3/16/2023</a:t>
+              <a:t>3/17/2023</a:t>
             </a:fld>
             <a:endParaRPr lang="en-US"/>
           </a:p>
@@ -5729,7 +5742,7 @@
           <a:p>
             <a:fld id="{C8669077-1F13-4707-957A-C7373207963B}" type="datetimeFigureOut">
               <a:rPr lang="en-US" smtClean="0"/>
-              <a:t>3/16/2023</a:t>
+              <a:t>3/17/2023</a:t>
             </a:fld>
             <a:endParaRPr lang="en-US"/>
           </a:p>
@@ -5909,7 +5922,7 @@
           <a:p>
             <a:fld id="{C8669077-1F13-4707-957A-C7373207963B}" type="datetimeFigureOut">
               <a:rPr lang="en-US" smtClean="0"/>
-              <a:t>3/16/2023</a:t>
+              <a:t>3/17/2023</a:t>
             </a:fld>
             <a:endParaRPr lang="en-US"/>
           </a:p>
@@ -6079,7 +6092,7 @@
           <a:p>
             <a:fld id="{C8669077-1F13-4707-957A-C7373207963B}" type="datetimeFigureOut">
               <a:rPr lang="en-US" smtClean="0"/>
-              <a:t>3/16/2023</a:t>
+              <a:t>3/17/2023</a:t>
             </a:fld>
             <a:endParaRPr lang="en-US"/>
           </a:p>
@@ -6326,7 +6339,7 @@
           <a:p>
             <a:fld id="{C8669077-1F13-4707-957A-C7373207963B}" type="datetimeFigureOut">
               <a:rPr lang="en-US" smtClean="0"/>
-              <a:t>3/16/2023</a:t>
+              <a:t>3/17/2023</a:t>
             </a:fld>
             <a:endParaRPr lang="en-US"/>
           </a:p>
@@ -6618,7 +6631,7 @@
           <a:p>
             <a:fld id="{C8669077-1F13-4707-957A-C7373207963B}" type="datetimeFigureOut">
               <a:rPr lang="en-US" smtClean="0"/>
-              <a:t>3/16/2023</a:t>
+              <a:t>3/17/2023</a:t>
             </a:fld>
             <a:endParaRPr lang="en-US"/>
           </a:p>
@@ -7062,7 +7075,7 @@
           <a:p>
             <a:fld id="{C8669077-1F13-4707-957A-C7373207963B}" type="datetimeFigureOut">
               <a:rPr lang="en-US" smtClean="0"/>
-              <a:t>3/16/2023</a:t>
+              <a:t>3/17/2023</a:t>
             </a:fld>
             <a:endParaRPr lang="en-US"/>
           </a:p>
@@ -7180,7 +7193,7 @@
           <a:p>
             <a:fld id="{C8669077-1F13-4707-957A-C7373207963B}" type="datetimeFigureOut">
               <a:rPr lang="en-US" smtClean="0"/>
-              <a:t>3/16/2023</a:t>
+              <a:t>3/17/2023</a:t>
             </a:fld>
             <a:endParaRPr lang="en-US"/>
           </a:p>
@@ -7275,7 +7288,7 @@
           <a:p>
             <a:fld id="{C8669077-1F13-4707-957A-C7373207963B}" type="datetimeFigureOut">
               <a:rPr lang="en-US" smtClean="0"/>
-              <a:t>3/16/2023</a:t>
+              <a:t>3/17/2023</a:t>
             </a:fld>
             <a:endParaRPr lang="en-US"/>
           </a:p>
@@ -7554,7 +7567,7 @@
           <a:p>
             <a:fld id="{C8669077-1F13-4707-957A-C7373207963B}" type="datetimeFigureOut">
               <a:rPr lang="en-US" smtClean="0"/>
-              <a:t>3/16/2023</a:t>
+              <a:t>3/17/2023</a:t>
             </a:fld>
             <a:endParaRPr lang="en-US"/>
           </a:p>
@@ -7829,7 +7842,7 @@
           <a:p>
             <a:fld id="{C8669077-1F13-4707-957A-C7373207963B}" type="datetimeFigureOut">
               <a:rPr lang="en-US" smtClean="0"/>
-              <a:t>3/16/2023</a:t>
+              <a:t>3/17/2023</a:t>
             </a:fld>
             <a:endParaRPr lang="en-US"/>
           </a:p>
@@ -8258,7 +8271,7 @@
           <a:p>
             <a:fld id="{C8669077-1F13-4707-957A-C7373207963B}" type="datetimeFigureOut">
               <a:rPr lang="en-US" smtClean="0"/>
-              <a:t>3/16/2023</a:t>
+              <a:t>3/17/2023</a:t>
             </a:fld>
             <a:endParaRPr lang="en-US"/>
           </a:p>

</xml_diff>